<commit_message>
Add the live demo
</commit_message>
<xml_diff>
--- a/SIG VBCS Low Code Development .pptx
+++ b/SIG VBCS Low Code Development .pptx
@@ -114,6 +114,11 @@
       </a:defRPr>
     </a:lvl9pPr>
   </p:defaultTextStyle>
+  <p:extLst>
+    <p:ext uri="{EFAFB233-063F-42B5-8137-9DF3F51BA10A}">
+      <p15:sldGuideLst xmlns:p15="http://schemas.microsoft.com/office/powerpoint/2012/main"/>
+    </p:ext>
+  </p:extLst>
 </p:presentation>
 </file>
 
@@ -9068,6 +9073,78 @@
               </a:rPr>
               <a:t>https://visualbuilderhmensingqsvb-hmensing.builder.ocp.oraclecloud.com/ic/builder/</a:t>
             </a:r>
+            <a:endParaRPr lang="en-US" dirty="0"/>
+          </a:p>
+          <a:p>
+            <a:pPr marL="458280" lvl="1">
+              <a:lnSpc>
+                <a:spcPct val="120000"/>
+              </a:lnSpc>
+              <a:buClr>
+                <a:srgbClr val="000000"/>
+              </a:buClr>
+            </a:pPr>
+            <a:endParaRPr lang="en-US" sz="1500" spc="-1" dirty="0">
+              <a:solidFill>
+                <a:srgbClr val="000000"/>
+              </a:solidFill>
+              <a:latin typeface="Arial"/>
+            </a:endParaRPr>
+          </a:p>
+          <a:p>
+            <a:pPr marL="286830" indent="-285750">
+              <a:lnSpc>
+                <a:spcPct val="120000"/>
+              </a:lnSpc>
+              <a:buClr>
+                <a:srgbClr val="000000"/>
+              </a:buClr>
+              <a:buFont typeface="Arial" panose="020B0604020202020204" pitchFamily="34" charset="0"/>
+              <a:buChar char="•"/>
+            </a:pPr>
+            <a:r>
+              <a:rPr lang="en-US" sz="1500" spc="-1" dirty="0">
+                <a:solidFill>
+                  <a:srgbClr val="000000"/>
+                </a:solidFill>
+                <a:latin typeface="Arial"/>
+              </a:rPr>
+              <a:t>This is roughly what you will create</a:t>
+            </a:r>
+          </a:p>
+          <a:p>
+            <a:pPr marL="458280" lvl="1">
+              <a:lnSpc>
+                <a:spcPct val="120000"/>
+              </a:lnSpc>
+              <a:buClr>
+                <a:srgbClr val="000000"/>
+              </a:buClr>
+            </a:pPr>
+            <a:r>
+              <a:rPr lang="en-US" sz="1500" spc="-1" dirty="0">
+                <a:solidFill>
+                  <a:srgbClr val="000000"/>
+                </a:solidFill>
+                <a:hlinkClick r:id="rId4"/>
+              </a:rPr>
+              <a:t>https://visualbuilderhmensingqsvb-hmensing.builder.ocp.oraclecloud.com/ic/builder/rt/HermanM/live/webApps/mugsapp/</a:t>
+            </a:r>
+            <a:endParaRPr lang="en-US" sz="1500" spc="-1" dirty="0">
+              <a:solidFill>
+                <a:srgbClr val="000000"/>
+              </a:solidFill>
+            </a:endParaRPr>
+          </a:p>
+          <a:p>
+            <a:pPr marL="458280" lvl="1">
+              <a:lnSpc>
+                <a:spcPct val="120000"/>
+              </a:lnSpc>
+              <a:buClr>
+                <a:srgbClr val="000000"/>
+              </a:buClr>
+            </a:pPr>
             <a:endParaRPr lang="en-US" sz="1500" spc="-1" dirty="0">
               <a:solidFill>
                 <a:srgbClr val="000000"/>

</xml_diff>